<commit_message>
# Facture modèle # 2.xlsx
</commit_message>
<xml_diff>
--- a/Projet Informatique 2023.pptx
+++ b/Projet Informatique 2023.pptx
@@ -256,7 +256,7 @@
             <a:pPr rtl="0"/>
             <a:fld id="{6F451AC6-85E2-4791-B76A-111E00854099}" type="datetime1">
               <a:rPr lang="fr-CA" smtClean="0"/>
-              <a:t>30/août/2023</a:t>
+              <a:t>22/sept.2023</a:t>
             </a:fld>
             <a:endParaRPr lang="fr-CA"/>
           </a:p>
@@ -426,7 +426,7 @@
             <a:pPr rtl="0"/>
             <a:fld id="{882F3D0E-15D1-4107-BF81-D397973C3ACA}" type="datetime1">
               <a:rPr lang="fr-CA" noProof="0" smtClean="0"/>
-              <a:t>30/août/2023</a:t>
+              <a:t>22/sept.2023</a:t>
             </a:fld>
             <a:endParaRPr lang="fr-CA" noProof="0"/>
           </a:p>
@@ -1824,7 +1824,7 @@
             <a:pPr rtl="0"/>
             <a:fld id="{8E4393AA-83AB-4C1D-9AA6-90DC24897380}" type="datetime1">
               <a:rPr lang="fr-CA" noProof="0" smtClean="0"/>
-              <a:t>30/août/2023</a:t>
+              <a:t>22/sept.2023</a:t>
             </a:fld>
             <a:endParaRPr lang="fr-CA" noProof="0"/>
           </a:p>
@@ -2451,7 +2451,7 @@
             <a:pPr rtl="0"/>
             <a:fld id="{26C39E59-7447-42B2-B3A8-8AA09D34630C}" type="datetime1">
               <a:rPr lang="fr-CA" noProof="0" smtClean="0"/>
-              <a:t>30/août/2023</a:t>
+              <a:t>22/sept.2023</a:t>
             </a:fld>
             <a:endParaRPr lang="fr-CA" noProof="0"/>
           </a:p>
@@ -3084,7 +3084,7 @@
         <p:spPr>
           <a:xfrm>
             <a:off x="601908" y="1667356"/>
-            <a:ext cx="4427291" cy="2031325"/>
+            <a:ext cx="4427291" cy="2893100"/>
           </a:xfrm>
           <a:prstGeom prst="rect">
             <a:avLst/>
@@ -3103,7 +3103,7 @@
             </a:pPr>
             <a:r>
               <a:rPr lang="fr-CA" sz="1400" dirty="0"/>
-              <a:t>Facturation</a:t>
+              <a:t>Plan comptable</a:t>
             </a:r>
             <a:br>
               <a:rPr lang="fr-CA" sz="1400" dirty="0"/>
@@ -3117,7 +3117,41 @@
             </a:pPr>
             <a:r>
               <a:rPr lang="fr-CA" sz="1400" dirty="0"/>
-              <a:t>Plan comptable</a:t>
+              <a:t>Facturation</a:t>
+            </a:r>
+          </a:p>
+          <a:p>
+            <a:pPr marL="285750" indent="-285750">
+              <a:buFont typeface="Arial" panose="020B0604020202020204" pitchFamily="34" charset="0"/>
+              <a:buChar char="•"/>
+            </a:pPr>
+            <a:endParaRPr lang="fr-CA" sz="1400" dirty="0"/>
+          </a:p>
+          <a:p>
+            <a:pPr marL="285750" indent="-285750">
+              <a:buFont typeface="Arial" panose="020B0604020202020204" pitchFamily="34" charset="0"/>
+              <a:buChar char="•"/>
+            </a:pPr>
+            <a:r>
+              <a:rPr lang="fr-CA" sz="1400" dirty="0"/>
+              <a:t>Comptabilisation des factures</a:t>
+            </a:r>
+          </a:p>
+          <a:p>
+            <a:pPr marL="285750" indent="-285750">
+              <a:buFont typeface="Arial" panose="020B0604020202020204" pitchFamily="34" charset="0"/>
+              <a:buChar char="•"/>
+            </a:pPr>
+            <a:endParaRPr lang="fr-CA" sz="1400" dirty="0"/>
+          </a:p>
+          <a:p>
+            <a:pPr marL="285750" indent="-285750">
+              <a:buFont typeface="Arial" panose="020B0604020202020204" pitchFamily="34" charset="0"/>
+              <a:buChar char="•"/>
+            </a:pPr>
+            <a:r>
+              <a:rPr lang="fr-CA" sz="1400" dirty="0"/>
+              <a:t>Suivi des comptes clients</a:t>
             </a:r>
             <a:br>
               <a:rPr lang="fr-CA" sz="1400" dirty="0"/>
@@ -3131,7 +3165,7 @@
             </a:pPr>
             <a:r>
               <a:rPr lang="fr-CA" sz="1400" dirty="0"/>
-              <a:t>Répertoire de plusieurs données</a:t>
+              <a:t>? Répertoire de plusieurs données</a:t>
             </a:r>
             <a:br>
               <a:rPr lang="fr-CA" sz="1400" dirty="0"/>
@@ -3145,7 +3179,7 @@
             </a:pPr>
             <a:r>
               <a:rPr lang="fr-CA" sz="1400" dirty="0"/>
-              <a:t>Possibilité d’échange avec Outlook</a:t>
+              <a:t>? Possibilité d’échange avec Outlook</a:t>
             </a:r>
             <a:br>
               <a:rPr lang="fr-CA" sz="1400" dirty="0"/>

</xml_diff>